<commit_message>
clases 4 a 6 vf
</commit_message>
<xml_diff>
--- a/clase4/teoricas_4a6.pptx
+++ b/clase4/teoricas_4a6.pptx
@@ -22348,8 +22348,8 @@
           <a:chExt cx="0" cy="0"/>
         </a:xfrm>
       </p:grpSpPr>
-      <mc:AlternateContent xmlns:mc="http://schemas.openxmlformats.org/markup-compatibility/2006" xmlns:a14="http://schemas.microsoft.com/office/drawing/2010/main">
-        <mc:Choice Requires="a14">
+      <mc:AlternateContent xmlns:mc="http://schemas.openxmlformats.org/markup-compatibility/2006">
+        <mc:Choice xmlns:a14="http://schemas.microsoft.com/office/drawing/2010/main" Requires="a14">
           <p:sp>
             <p:nvSpPr>
               <p:cNvPr id="153" name="Google Shape;153;p27"/>
@@ -22411,12 +22411,13 @@
                   </a:rPr>
                 </a:br>
                 <a:r>
-                  <a:rPr lang="es-MX" sz="1600" b="1" dirty="0">
+                  <a:rPr lang="es-MX" sz="1600" dirty="0">
                     <a:solidFill>
                       <a:schemeClr val="accent3"/>
                     </a:solidFill>
+                    <a:latin typeface="+mj-lt"/>
                   </a:rPr>
-                  <a:t>Idea: </a:t>
+                  <a:t>Para variables continuas, </a:t>
                 </a:r>
                 <a:r>
                   <a:rPr lang="es-MX" sz="1600" dirty="0">
@@ -22424,7 +22425,7 @@
                       <a:schemeClr val="accent3"/>
                     </a:solidFill>
                   </a:rPr>
-                  <a:t>Se asume que las distribuciones de X para cada clase de Y son normales con una media propia y una varianza común</a:t>
+                  <a:t>se asume que las distribuciones de X para cada clase de Y son normales con una media propia y una varianza común</a:t>
                 </a:r>
                 <a:br>
                   <a:rPr lang="es-MX" sz="1600" dirty="0">
@@ -22832,7 +22833,7 @@
             </p:txBody>
           </p:sp>
         </mc:Choice>
-        <mc:Fallback xmlns="">
+        <mc:Fallback>
           <p:sp>
             <p:nvSpPr>
               <p:cNvPr id="153" name="Google Shape;153;p27"/>

</xml_diff>

<commit_message>
pequeño cambio clase 4
</commit_message>
<xml_diff>
--- a/clase4/teoricas_4a6.pptx
+++ b/clase4/teoricas_4a6.pptx
@@ -10619,8 +10619,8 @@
         </p:nvSpPr>
         <p:spPr>
           <a:xfrm>
-            <a:off x="-85060" y="3396522"/>
-            <a:ext cx="4837814" cy="276999"/>
+            <a:off x="21266" y="3419969"/>
+            <a:ext cx="4674969" cy="276999"/>
           </a:xfrm>
           <a:prstGeom prst="rect">
             <a:avLst/>
@@ -10943,8 +10943,8 @@
         </p:nvSpPr>
         <p:spPr>
           <a:xfrm>
-            <a:off x="4306187" y="3393673"/>
-            <a:ext cx="4837813" cy="276999"/>
+            <a:off x="4717501" y="3457889"/>
+            <a:ext cx="4288277" cy="276999"/>
           </a:xfrm>
           <a:prstGeom prst="rect">
             <a:avLst/>
@@ -10976,7 +10976,7 @@
                 <a:latin typeface="Proxima Nova" panose="020B0604020202020204" charset="0"/>
                 <a:ea typeface="Cambria Math" panose="02040503050406030204" pitchFamily="18" charset="0"/>
               </a:rPr>
-              <a:t>¿Que pasará con el odds ratio si la persona trabaja 41hs?</a:t>
+              <a:t>¿Qué pasará con el odds ratio si la persona trabaja 41hs?</a:t>
             </a:r>
             <a:endParaRPr kumimoji="0" lang="es-AR" altLang="es-AR" sz="1800" b="0" i="0" u="none" strike="noStrike" cap="none" normalizeH="0" baseline="0" dirty="0">
               <a:ln>
@@ -11994,6 +11994,256 @@
           </a:p>
         </p:txBody>
       </p:sp>
+      <mc:AlternateContent xmlns:mc="http://schemas.openxmlformats.org/markup-compatibility/2006" xmlns:a14="http://schemas.microsoft.com/office/drawing/2010/main">
+        <mc:Choice Requires="a14">
+          <p:sp>
+            <p:nvSpPr>
+              <p:cNvPr id="10" name="CuadroTexto 9">
+                <a:extLst>
+                  <a:ext uri="{FF2B5EF4-FFF2-40B4-BE49-F238E27FC236}">
+                    <a16:creationId xmlns:a16="http://schemas.microsoft.com/office/drawing/2014/main" id="{523F21F8-361F-84C2-03C6-094B9B8113A1}"/>
+                  </a:ext>
+                </a:extLst>
+              </p:cNvPr>
+              <p:cNvSpPr txBox="1"/>
+              <p:nvPr/>
+            </p:nvSpPr>
+            <p:spPr>
+              <a:xfrm>
+                <a:off x="-219198" y="2237174"/>
+                <a:ext cx="2577948" cy="307777"/>
+              </a:xfrm>
+              <a:prstGeom prst="rect">
+                <a:avLst/>
+              </a:prstGeom>
+              <a:noFill/>
+            </p:spPr>
+            <p:txBody>
+              <a:bodyPr wrap="square">
+                <a:spAutoFit/>
+              </a:bodyPr>
+              <a:lstStyle/>
+              <a:p>
+                <a:pPr/>
+                <a14:m>
+                  <m:oMathPara xmlns:m="http://schemas.openxmlformats.org/officeDocument/2006/math">
+                    <m:oMathParaPr>
+                      <m:jc m:val="centerGroup"/>
+                    </m:oMathParaPr>
+                    <m:oMath xmlns:m="http://schemas.openxmlformats.org/officeDocument/2006/math">
+                      <m:r>
+                        <a:rPr lang="es-MX" i="1" smtClean="0">
+                          <a:solidFill>
+                            <a:schemeClr val="tx1"/>
+                          </a:solidFill>
+                          <a:latin typeface="Cambria Math" panose="02040503050406030204" pitchFamily="18" charset="0"/>
+                          <a:ea typeface="Cambria Math" panose="02040503050406030204" pitchFamily="18" charset="0"/>
+                        </a:rPr>
+                        <m:t>𝑒𝑥</m:t>
+                      </m:r>
+                      <m:func>
+                        <m:funcPr>
+                          <m:ctrlPr>
+                            <a:rPr lang="es-MX" i="1">
+                              <a:solidFill>
+                                <a:schemeClr val="tx1"/>
+                              </a:solidFill>
+                              <a:latin typeface="Cambria Math" panose="02040503050406030204" pitchFamily="18" charset="0"/>
+                              <a:ea typeface="Cambria Math" panose="02040503050406030204" pitchFamily="18" charset="0"/>
+                            </a:rPr>
+                          </m:ctrlPr>
+                        </m:funcPr>
+                        <m:fName>
+                          <m:r>
+                            <a:rPr lang="es-MX" i="1">
+                              <a:solidFill>
+                                <a:schemeClr val="tx1"/>
+                              </a:solidFill>
+                              <a:latin typeface="Cambria Math" panose="02040503050406030204" pitchFamily="18" charset="0"/>
+                              <a:ea typeface="Cambria Math" panose="02040503050406030204" pitchFamily="18" charset="0"/>
+                            </a:rPr>
+                            <m:t>𝑝</m:t>
+                          </m:r>
+                        </m:fName>
+                        <m:e>
+                          <m:d>
+                            <m:dPr>
+                              <m:ctrlPr>
+                                <a:rPr lang="es-MX" i="1">
+                                  <a:solidFill>
+                                    <a:schemeClr val="tx1"/>
+                                  </a:solidFill>
+                                  <a:latin typeface="Cambria Math" panose="02040503050406030204" pitchFamily="18" charset="0"/>
+                                  <a:ea typeface="Cambria Math" panose="02040503050406030204" pitchFamily="18" charset="0"/>
+                                </a:rPr>
+                              </m:ctrlPr>
+                            </m:dPr>
+                            <m:e>
+                              <m:r>
+                                <a:rPr lang="es-MX" b="0" i="1" smtClean="0">
+                                  <a:solidFill>
+                                    <a:schemeClr val="tx1"/>
+                                  </a:solidFill>
+                                  <a:latin typeface="Cambria Math" panose="02040503050406030204" pitchFamily="18" charset="0"/>
+                                  <a:ea typeface="Cambria Math" panose="02040503050406030204" pitchFamily="18" charset="0"/>
+                                </a:rPr>
+                                <m:t>−0.1131289</m:t>
+                              </m:r>
+                            </m:e>
+                          </m:d>
+                        </m:e>
+                      </m:func>
+                      <m:r>
+                        <a:rPr lang="es-MX" b="0" i="1" smtClean="0">
+                          <a:solidFill>
+                            <a:schemeClr val="tx1"/>
+                          </a:solidFill>
+                          <a:latin typeface="Cambria Math" panose="02040503050406030204" pitchFamily="18" charset="0"/>
+                          <a:ea typeface="Cambria Math" panose="02040503050406030204" pitchFamily="18" charset="0"/>
+                        </a:rPr>
+                        <m:t>=0.89</m:t>
+                      </m:r>
+                    </m:oMath>
+                  </m:oMathPara>
+                </a14:m>
+                <a:endParaRPr lang="es-AR" dirty="0">
+                  <a:solidFill>
+                    <a:schemeClr val="tx1"/>
+                  </a:solidFill>
+                </a:endParaRPr>
+              </a:p>
+            </p:txBody>
+          </p:sp>
+        </mc:Choice>
+        <mc:Fallback xmlns="">
+          <p:sp>
+            <p:nvSpPr>
+              <p:cNvPr id="10" name="CuadroTexto 9">
+                <a:extLst>
+                  <a:ext uri="{FF2B5EF4-FFF2-40B4-BE49-F238E27FC236}">
+                    <a16:creationId xmlns:a16="http://schemas.microsoft.com/office/drawing/2014/main" id="{523F21F8-361F-84C2-03C6-094B9B8113A1}"/>
+                  </a:ext>
+                </a:extLst>
+              </p:cNvPr>
+              <p:cNvSpPr txBox="1">
+                <a:spLocks noRot="1" noChangeAspect="1" noMove="1" noResize="1" noEditPoints="1" noAdjustHandles="1" noChangeArrowheads="1" noChangeShapeType="1" noTextEdit="1"/>
+              </p:cNvSpPr>
+              <p:nvPr/>
+            </p:nvSpPr>
+            <p:spPr>
+              <a:xfrm>
+                <a:off x="-219198" y="2237174"/>
+                <a:ext cx="2577948" cy="307777"/>
+              </a:xfrm>
+              <a:prstGeom prst="rect">
+                <a:avLst/>
+              </a:prstGeom>
+              <a:blipFill>
+                <a:blip r:embed="rId9"/>
+                <a:stretch>
+                  <a:fillRect b="-4000"/>
+                </a:stretch>
+              </a:blipFill>
+            </p:spPr>
+            <p:txBody>
+              <a:bodyPr/>
+              <a:lstStyle/>
+              <a:p>
+                <a:r>
+                  <a:rPr lang="es-AR">
+                    <a:noFill/>
+                  </a:rPr>
+                  <a:t> </a:t>
+                </a:r>
+              </a:p>
+            </p:txBody>
+          </p:sp>
+        </mc:Fallback>
+      </mc:AlternateContent>
+      <p:cxnSp>
+        <p:nvCxnSpPr>
+          <p:cNvPr id="22" name="Conector: curvado 21">
+            <a:extLst>
+              <a:ext uri="{FF2B5EF4-FFF2-40B4-BE49-F238E27FC236}">
+                <a16:creationId xmlns:a16="http://schemas.microsoft.com/office/drawing/2014/main" id="{0448E105-C2A5-DE5B-9B12-15772C5FF1CD}"/>
+              </a:ext>
+            </a:extLst>
+          </p:cNvPr>
+          <p:cNvCxnSpPr>
+            <a:cxnSpLocks/>
+            <a:endCxn id="10" idx="0"/>
+          </p:cNvCxnSpPr>
+          <p:nvPr/>
+        </p:nvCxnSpPr>
+        <p:spPr>
+          <a:xfrm rot="10800000" flipV="1">
+            <a:off x="1069777" y="1562986"/>
+            <a:ext cx="2183787" cy="674188"/>
+          </a:xfrm>
+          <a:prstGeom prst="curvedConnector2">
+            <a:avLst/>
+          </a:prstGeom>
+          <a:ln>
+            <a:tailEnd type="triangle"/>
+          </a:ln>
+        </p:spPr>
+        <p:style>
+          <a:lnRef idx="1">
+            <a:schemeClr val="accent1"/>
+          </a:lnRef>
+          <a:fillRef idx="0">
+            <a:schemeClr val="accent1"/>
+          </a:fillRef>
+          <a:effectRef idx="0">
+            <a:schemeClr val="accent1"/>
+          </a:effectRef>
+          <a:fontRef idx="minor">
+            <a:schemeClr val="tx1"/>
+          </a:fontRef>
+        </p:style>
+      </p:cxnSp>
+      <p:cxnSp>
+        <p:nvCxnSpPr>
+          <p:cNvPr id="23" name="Conector: curvado 22">
+            <a:extLst>
+              <a:ext uri="{FF2B5EF4-FFF2-40B4-BE49-F238E27FC236}">
+                <a16:creationId xmlns:a16="http://schemas.microsoft.com/office/drawing/2014/main" id="{2CFE72EC-2DE8-2A37-98AC-041ECA221EA1}"/>
+              </a:ext>
+            </a:extLst>
+          </p:cNvPr>
+          <p:cNvCxnSpPr>
+            <a:cxnSpLocks/>
+            <a:stCxn id="10" idx="2"/>
+          </p:cNvCxnSpPr>
+          <p:nvPr/>
+        </p:nvCxnSpPr>
+        <p:spPr>
+          <a:xfrm rot="16200000" flipH="1">
+            <a:off x="1676763" y="1937964"/>
+            <a:ext cx="427674" cy="1641648"/>
+          </a:xfrm>
+          <a:prstGeom prst="curvedConnector2">
+            <a:avLst/>
+          </a:prstGeom>
+          <a:ln>
+            <a:tailEnd type="triangle"/>
+          </a:ln>
+        </p:spPr>
+        <p:style>
+          <a:lnRef idx="1">
+            <a:schemeClr val="accent1"/>
+          </a:lnRef>
+          <a:fillRef idx="0">
+            <a:schemeClr val="accent1"/>
+          </a:fillRef>
+          <a:effectRef idx="0">
+            <a:schemeClr val="accent1"/>
+          </a:effectRef>
+          <a:fontRef idx="minor">
+            <a:schemeClr val="tx1"/>
+          </a:fontRef>
+        </p:style>
+      </p:cxnSp>
     </p:spTree>
     <p:extLst>
       <p:ext uri="{BB962C8B-B14F-4D97-AF65-F5344CB8AC3E}">
@@ -32145,8 +32395,8 @@
           </p:sp>
         </mc:Fallback>
       </mc:AlternateContent>
-      <mc:AlternateContent xmlns:mc="http://schemas.openxmlformats.org/markup-compatibility/2006">
-        <mc:Choice xmlns:a14="http://schemas.microsoft.com/office/drawing/2010/main" Requires="a14">
+      <mc:AlternateContent xmlns:mc="http://schemas.openxmlformats.org/markup-compatibility/2006" xmlns:a14="http://schemas.microsoft.com/office/drawing/2010/main">
+        <mc:Choice Requires="a14">
           <p:sp>
             <p:nvSpPr>
               <p:cNvPr id="20" name="CuadroTexto 19">
@@ -32162,7 +32412,7 @@
             <p:spPr>
               <a:xfrm>
                 <a:off x="74428" y="4193631"/>
-                <a:ext cx="6507125" cy="700641"/>
+                <a:ext cx="6507125" cy="671338"/>
               </a:xfrm>
               <a:prstGeom prst="rect">
                 <a:avLst/>
@@ -32311,13 +32561,34 @@
                       </m:fPr>
                       <m:num>
                         <m:r>
-                          <m:rPr>
-                            <m:nor/>
-                          </m:rPr>
-                          <a:rPr lang="es-MX" i="1">
-                            <a:latin typeface="Proxima Nova" panose="020B0604020202020204" charset="0"/>
+                          <a:rPr lang="es-MX" b="0" i="1" smtClean="0">
+                            <a:solidFill>
+                              <a:schemeClr val="tx1"/>
+                            </a:solidFill>
+                            <a:latin typeface="Cambria Math" panose="02040503050406030204" pitchFamily="18" charset="0"/>
+                            <a:ea typeface="Cambria Math" panose="02040503050406030204" pitchFamily="18" charset="0"/>
                           </a:rPr>
-                          <m:t>oddsratio</m:t>
+                          <m:t>𝑜𝑑𝑑𝑠</m:t>
+                        </m:r>
+                        <m:r>
+                          <a:rPr lang="es-MX" b="0" i="1" smtClean="0">
+                            <a:solidFill>
+                              <a:schemeClr val="tx1"/>
+                            </a:solidFill>
+                            <a:latin typeface="Cambria Math" panose="02040503050406030204" pitchFamily="18" charset="0"/>
+                            <a:ea typeface="Cambria Math" panose="02040503050406030204" pitchFamily="18" charset="0"/>
+                          </a:rPr>
+                          <m:t> </m:t>
+                        </m:r>
+                        <m:r>
+                          <a:rPr lang="es-MX" b="0" i="1" smtClean="0">
+                            <a:solidFill>
+                              <a:schemeClr val="tx1"/>
+                            </a:solidFill>
+                            <a:latin typeface="Cambria Math" panose="02040503050406030204" pitchFamily="18" charset="0"/>
+                            <a:ea typeface="Cambria Math" panose="02040503050406030204" pitchFamily="18" charset="0"/>
+                          </a:rPr>
+                          <m:t>𝑟𝑎𝑡𝑖𝑜</m:t>
                         </m:r>
                         <m:r>
                           <a:rPr lang="es-MX" i="1">
@@ -32340,13 +32611,34 @@
                       </m:num>
                       <m:den>
                         <m:r>
-                          <m:rPr>
-                            <m:nor/>
-                          </m:rPr>
                           <a:rPr lang="es-MX" i="1">
-                            <a:latin typeface="Proxima Nova" panose="020B0604020202020204" charset="0"/>
+                            <a:solidFill>
+                              <a:schemeClr val="tx1"/>
+                            </a:solidFill>
+                            <a:latin typeface="Cambria Math" panose="02040503050406030204" pitchFamily="18" charset="0"/>
+                            <a:ea typeface="Cambria Math" panose="02040503050406030204" pitchFamily="18" charset="0"/>
                           </a:rPr>
-                          <m:t>oddsratio</m:t>
+                          <m:t>𝑜𝑑𝑑𝑠</m:t>
+                        </m:r>
+                        <m:r>
+                          <a:rPr lang="es-MX" i="1">
+                            <a:solidFill>
+                              <a:schemeClr val="tx1"/>
+                            </a:solidFill>
+                            <a:latin typeface="Cambria Math" panose="02040503050406030204" pitchFamily="18" charset="0"/>
+                            <a:ea typeface="Cambria Math" panose="02040503050406030204" pitchFamily="18" charset="0"/>
+                          </a:rPr>
+                          <m:t> </m:t>
+                        </m:r>
+                        <m:r>
+                          <a:rPr lang="es-MX" i="1">
+                            <a:solidFill>
+                              <a:schemeClr val="tx1"/>
+                            </a:solidFill>
+                            <a:latin typeface="Cambria Math" panose="02040503050406030204" pitchFamily="18" charset="0"/>
+                            <a:ea typeface="Cambria Math" panose="02040503050406030204" pitchFamily="18" charset="0"/>
+                          </a:rPr>
+                          <m:t>𝑟𝑎𝑡𝑖𝑜</m:t>
                         </m:r>
                         <m:r>
                           <a:rPr lang="es-MX" i="1">
@@ -32431,7 +32723,7 @@
             </p:txBody>
           </p:sp>
         </mc:Choice>
-        <mc:Fallback>
+        <mc:Fallback xmlns="">
           <p:sp>
             <p:nvSpPr>
               <p:cNvPr id="20" name="CuadroTexto 19">
@@ -32449,7 +32741,7 @@
             <p:spPr>
               <a:xfrm>
                 <a:off x="74428" y="4193631"/>
-                <a:ext cx="6507125" cy="700641"/>
+                <a:ext cx="6507125" cy="671338"/>
               </a:xfrm>
               <a:prstGeom prst="rect">
                 <a:avLst/>
@@ -32457,7 +32749,7 @@
               <a:blipFill>
                 <a:blip r:embed="rId6"/>
                 <a:stretch>
-                  <a:fillRect l="-281" b="-1739"/>
+                  <a:fillRect l="-281" b="-2727"/>
                 </a:stretch>
               </a:blipFill>
             </p:spPr>
@@ -33458,8 +33750,8 @@
           </a:p>
         </p:txBody>
       </p:sp>
-      <mc:AlternateContent xmlns:mc="http://schemas.openxmlformats.org/markup-compatibility/2006">
-        <mc:Choice xmlns:a14="http://schemas.microsoft.com/office/drawing/2010/main" Requires="a14">
+      <mc:AlternateContent xmlns:mc="http://schemas.openxmlformats.org/markup-compatibility/2006" xmlns:a14="http://schemas.microsoft.com/office/drawing/2010/main">
+        <mc:Choice Requires="a14">
           <p:sp>
             <p:nvSpPr>
               <p:cNvPr id="10" name="CuadroTexto 9">
@@ -33717,7 +34009,7 @@
             </p:txBody>
           </p:sp>
         </mc:Choice>
-        <mc:Fallback>
+        <mc:Fallback xmlns="">
           <p:sp>
             <p:nvSpPr>
               <p:cNvPr id="10" name="CuadroTexto 9">

</xml_diff>